<commit_message>
Homework 2: aggiornate le slide
</commit_message>
<xml_diff>
--- a/Slides/Homework #2.pptx
+++ b/Slides/Homework #2.pptx
@@ -9,34 +9,35 @@
     <p:sldId id="277" r:id="rId3"/>
     <p:sldId id="268" r:id="rId4"/>
     <p:sldId id="276" r:id="rId5"/>
-    <p:sldId id="275" r:id="rId6"/>
-    <p:sldId id="261" r:id="rId7"/>
-    <p:sldId id="273" r:id="rId8"/>
+    <p:sldId id="278" r:id="rId6"/>
+    <p:sldId id="275" r:id="rId7"/>
+    <p:sldId id="261" r:id="rId8"/>
+    <p:sldId id="273" r:id="rId9"/>
   </p:sldIdLst>
   <p:sldSz cx="18288000" cy="10287000"/>
   <p:notesSz cx="6858000" cy="9144000"/>
   <p:embeddedFontLst>
     <p:embeddedFont>
       <p:font typeface="Calibri" panose="020F0502020204030204" pitchFamily="34" charset="0"/>
-      <p:regular r:id="rId9"/>
-      <p:bold r:id="rId10"/>
-      <p:italic r:id="rId11"/>
-      <p:boldItalic r:id="rId12"/>
+      <p:regular r:id="rId10"/>
+      <p:bold r:id="rId11"/>
+      <p:italic r:id="rId12"/>
+      <p:boldItalic r:id="rId13"/>
     </p:embeddedFont>
     <p:embeddedFont>
       <p:font typeface="Montserrat" panose="00000500000000000000" pitchFamily="2" charset="0"/>
-      <p:regular r:id="rId13"/>
-      <p:bold r:id="rId14"/>
-      <p:italic r:id="rId15"/>
-      <p:boldItalic r:id="rId16"/>
+      <p:regular r:id="rId14"/>
+      <p:bold r:id="rId15"/>
+      <p:italic r:id="rId16"/>
+      <p:boldItalic r:id="rId17"/>
     </p:embeddedFont>
     <p:embeddedFont>
       <p:font typeface="Montserrat Bold" panose="00000800000000000000" charset="0"/>
-      <p:regular r:id="rId17"/>
+      <p:regular r:id="rId18"/>
     </p:embeddedFont>
     <p:embeddedFont>
       <p:font typeface="Montserrat Extra-Bold" panose="020B0604020202020204" charset="0"/>
-      <p:regular r:id="rId18"/>
+      <p:regular r:id="rId19"/>
     </p:embeddedFont>
   </p:embeddedFontLst>
   <p:defaultTextStyle>
@@ -153,6 +154,64 @@
 </p:presentation>
 </file>
 
+<file path=ppt/ink/ink1.xml><?xml version="1.0" encoding="utf-8"?>
+<inkml:ink xmlns:inkml="http://www.w3.org/2003/InkML">
+  <inkml:definitions>
+    <inkml:context xml:id="ctx0">
+      <inkml:inkSource xml:id="inkSrc0">
+        <inkml:traceFormat>
+          <inkml:channel name="X" type="integer" min="-2.14748E9" max="2.14748E9" units="cm"/>
+          <inkml:channel name="Y" type="integer" min="-2.14748E9" max="2.14748E9" units="cm"/>
+        </inkml:traceFormat>
+        <inkml:channelProperties>
+          <inkml:channelProperty channel="X" name="resolution" value="1000" units="1/cm"/>
+          <inkml:channelProperty channel="Y" name="resolution" value="1000" units="1/cm"/>
+        </inkml:channelProperties>
+      </inkml:inkSource>
+      <inkml:timestamp xml:id="ts0" timeString="2023-05-09T07:29:42.862"/>
+    </inkml:context>
+    <inkml:brush xml:id="br0">
+      <inkml:brushProperty name="width" value="0.3" units="cm"/>
+      <inkml:brushProperty name="height" value="0.6" units="cm"/>
+      <inkml:brushProperty name="color" value="#FF9900"/>
+      <inkml:brushProperty name="tip" value="rectangle"/>
+      <inkml:brushProperty name="rasterOp" value="maskPen"/>
+      <inkml:brushProperty name="ignorePressure" value="1"/>
+    </inkml:brush>
+  </inkml:definitions>
+  <inkml:trace contextRef="#ctx0" brushRef="#br0">0 0,'3565'0,"-3518"0</inkml:trace>
+</inkml:ink>
+</file>
+
+<file path=ppt/ink/ink2.xml><?xml version="1.0" encoding="utf-8"?>
+<inkml:ink xmlns:inkml="http://www.w3.org/2003/InkML">
+  <inkml:definitions>
+    <inkml:context xml:id="ctx0">
+      <inkml:inkSource xml:id="inkSrc0">
+        <inkml:traceFormat>
+          <inkml:channel name="X" type="integer" min="-2.14748E9" max="2.14748E9" units="cm"/>
+          <inkml:channel name="Y" type="integer" min="-2.14748E9" max="2.14748E9" units="cm"/>
+        </inkml:traceFormat>
+        <inkml:channelProperties>
+          <inkml:channelProperty channel="X" name="resolution" value="1000" units="1/cm"/>
+          <inkml:channelProperty channel="Y" name="resolution" value="1000" units="1/cm"/>
+        </inkml:channelProperties>
+      </inkml:inkSource>
+      <inkml:timestamp xml:id="ts0" timeString="2023-05-09T07:29:49.850"/>
+    </inkml:context>
+    <inkml:brush xml:id="br0">
+      <inkml:brushProperty name="width" value="0.3" units="cm"/>
+      <inkml:brushProperty name="height" value="0.6" units="cm"/>
+      <inkml:brushProperty name="color" value="#FF9900"/>
+      <inkml:brushProperty name="tip" value="rectangle"/>
+      <inkml:brushProperty name="rasterOp" value="maskPen"/>
+      <inkml:brushProperty name="ignorePressure" value="1"/>
+    </inkml:brush>
+  </inkml:definitions>
+  <inkml:trace contextRef="#ctx0" brushRef="#br0">0 0,'1290'0,"-1255"0</inkml:trace>
+</inkml:ink>
+</file>
+
 <file path=ppt/slideLayouts/slideLayout1.xml><?xml version="1.0" encoding="utf-8"?>
 <p:sldLayout xmlns:a="http://schemas.openxmlformats.org/drawingml/2006/main" xmlns:r="http://schemas.openxmlformats.org/officeDocument/2006/relationships" xmlns:p="http://schemas.openxmlformats.org/presentationml/2006/main" type="title" preserve="1">
   <p:cSld name="Title Slide">
@@ -333,7 +392,7 @@
             <a:fld id="{1D8BD707-D9CF-40AE-B4C6-C98DA3205C09}" type="datetimeFigureOut">
               <a:rPr lang="en-US" smtClean="0"/>
               <a:pPr/>
-              <a:t>5/8/2023</a:t>
+              <a:t>5/9/2023</a:t>
             </a:fld>
             <a:endParaRPr lang="en-US"/>
           </a:p>
@@ -498,7 +557,7 @@
             <a:fld id="{1D8BD707-D9CF-40AE-B4C6-C98DA3205C09}" type="datetimeFigureOut">
               <a:rPr lang="en-US" smtClean="0"/>
               <a:pPr/>
-              <a:t>5/8/2023</a:t>
+              <a:t>5/9/2023</a:t>
             </a:fld>
             <a:endParaRPr lang="en-US"/>
           </a:p>
@@ -673,7 +732,7 @@
             <a:fld id="{1D8BD707-D9CF-40AE-B4C6-C98DA3205C09}" type="datetimeFigureOut">
               <a:rPr lang="en-US" smtClean="0"/>
               <a:pPr/>
-              <a:t>5/8/2023</a:t>
+              <a:t>5/9/2023</a:t>
             </a:fld>
             <a:endParaRPr lang="en-US"/>
           </a:p>
@@ -838,7 +897,7 @@
             <a:fld id="{1D8BD707-D9CF-40AE-B4C6-C98DA3205C09}" type="datetimeFigureOut">
               <a:rPr lang="en-US" smtClean="0"/>
               <a:pPr/>
-              <a:t>5/8/2023</a:t>
+              <a:t>5/9/2023</a:t>
             </a:fld>
             <a:endParaRPr lang="en-US"/>
           </a:p>
@@ -1080,7 +1139,7 @@
             <a:fld id="{1D8BD707-D9CF-40AE-B4C6-C98DA3205C09}" type="datetimeFigureOut">
               <a:rPr lang="en-US" smtClean="0"/>
               <a:pPr/>
-              <a:t>5/8/2023</a:t>
+              <a:t>5/9/2023</a:t>
             </a:fld>
             <a:endParaRPr lang="en-US"/>
           </a:p>
@@ -1362,7 +1421,7 @@
             <a:fld id="{1D8BD707-D9CF-40AE-B4C6-C98DA3205C09}" type="datetimeFigureOut">
               <a:rPr lang="en-US" smtClean="0"/>
               <a:pPr/>
-              <a:t>5/8/2023</a:t>
+              <a:t>5/9/2023</a:t>
             </a:fld>
             <a:endParaRPr lang="en-US"/>
           </a:p>
@@ -1778,7 +1837,7 @@
             <a:fld id="{1D8BD707-D9CF-40AE-B4C6-C98DA3205C09}" type="datetimeFigureOut">
               <a:rPr lang="en-US" smtClean="0"/>
               <a:pPr/>
-              <a:t>5/8/2023</a:t>
+              <a:t>5/9/2023</a:t>
             </a:fld>
             <a:endParaRPr lang="en-US"/>
           </a:p>
@@ -1892,7 +1951,7 @@
             <a:fld id="{1D8BD707-D9CF-40AE-B4C6-C98DA3205C09}" type="datetimeFigureOut">
               <a:rPr lang="en-US" smtClean="0"/>
               <a:pPr/>
-              <a:t>5/8/2023</a:t>
+              <a:t>5/9/2023</a:t>
             </a:fld>
             <a:endParaRPr lang="en-US"/>
           </a:p>
@@ -1984,7 +2043,7 @@
             <a:fld id="{1D8BD707-D9CF-40AE-B4C6-C98DA3205C09}" type="datetimeFigureOut">
               <a:rPr lang="en-US" smtClean="0"/>
               <a:pPr/>
-              <a:t>5/8/2023</a:t>
+              <a:t>5/9/2023</a:t>
             </a:fld>
             <a:endParaRPr lang="en-US"/>
           </a:p>
@@ -2256,7 +2315,7 @@
             <a:fld id="{1D8BD707-D9CF-40AE-B4C6-C98DA3205C09}" type="datetimeFigureOut">
               <a:rPr lang="en-US" smtClean="0"/>
               <a:pPr/>
-              <a:t>5/8/2023</a:t>
+              <a:t>5/9/2023</a:t>
             </a:fld>
             <a:endParaRPr lang="en-US"/>
           </a:p>
@@ -2505,7 +2564,7 @@
             <a:fld id="{1D8BD707-D9CF-40AE-B4C6-C98DA3205C09}" type="datetimeFigureOut">
               <a:rPr lang="en-US" smtClean="0"/>
               <a:pPr/>
-              <a:t>5/8/2023</a:t>
+              <a:t>5/9/2023</a:t>
             </a:fld>
             <a:endParaRPr lang="en-US"/>
           </a:p>
@@ -2713,7 +2772,7 @@
             <a:fld id="{1D8BD707-D9CF-40AE-B4C6-C98DA3205C09}" type="datetimeFigureOut">
               <a:rPr lang="en-US" smtClean="0"/>
               <a:pPr/>
-              <a:t>5/8/2023</a:t>
+              <a:t>5/9/2023</a:t>
             </a:fld>
             <a:endParaRPr lang="en-US"/>
           </a:p>
@@ -3503,7 +3562,7 @@
         <p:spPr>
           <a:xfrm>
             <a:off x="1526990" y="3468139"/>
-            <a:ext cx="10357545" cy="2677656"/>
+            <a:ext cx="10357545" cy="3046988"/>
           </a:xfrm>
           <a:prstGeom prst="rect">
             <a:avLst/>
@@ -3523,10 +3582,11 @@
             <a:r>
               <a:rPr lang="it-IT" sz="2400" dirty="0">
                 <a:solidFill>
-                  <a:schemeClr val="bg1"/>
-                </a:solidFill>
-              </a:rPr>
-              <a:t>Si procede rimuovendo i record con gli ID non validi (nulli, aventi spazi o con una lunghezza errata) e rimuovendo i vada duplicati.</a:t>
+                  <a:srgbClr val="FFFFFF"/>
+                </a:solidFill>
+                <a:latin typeface="Montserrat"/>
+              </a:rPr>
+              <a:t>Si procede rimuovendo i record con gli ID non validi (nulli, aventi spazi o con una lunghezza errata) e rimuovendo i vari duplicati.</a:t>
             </a:r>
           </a:p>
           <a:p>
@@ -3537,40 +3597,45 @@
             <a:r>
               <a:rPr lang="it-IT" sz="2400" dirty="0">
                 <a:solidFill>
-                  <a:schemeClr val="bg1"/>
-                </a:solidFill>
+                  <a:srgbClr val="FFFFFF"/>
+                </a:solidFill>
+                <a:latin typeface="Montserrat"/>
               </a:rPr>
               <a:t>Inoltre per evitare che il file .csv venga letto considerando i </a:t>
             </a:r>
             <a:r>
               <a:rPr lang="it-IT" sz="2400" dirty="0" err="1">
                 <a:solidFill>
-                  <a:schemeClr val="bg1"/>
-                </a:solidFill>
-              </a:rPr>
-              <a:t>detal</a:t>
+                  <a:srgbClr val="FFFFFF"/>
+                </a:solidFill>
+                <a:latin typeface="Montserrat"/>
+              </a:rPr>
+              <a:t>detail</a:t>
             </a:r>
             <a:r>
               <a:rPr lang="it-IT" sz="2400" dirty="0">
                 <a:solidFill>
-                  <a:schemeClr val="bg1"/>
-                </a:solidFill>
+                  <a:srgbClr val="FFFFFF"/>
+                </a:solidFill>
+                <a:latin typeface="Montserrat"/>
               </a:rPr>
               <a:t> multilinea come dati separati, si aggiunge la funzione di lettura </a:t>
             </a:r>
             <a:r>
               <a:rPr lang="it-IT" sz="2400" dirty="0" err="1">
                 <a:solidFill>
-                  <a:schemeClr val="bg1"/>
-                </a:solidFill>
+                  <a:srgbClr val="FFFFFF"/>
+                </a:solidFill>
+                <a:latin typeface="Montserrat"/>
               </a:rPr>
               <a:t>multiline</a:t>
             </a:r>
             <a:r>
               <a:rPr lang="it-IT" sz="2400" dirty="0">
                 <a:solidFill>
-                  <a:schemeClr val="bg1"/>
-                </a:solidFill>
+                  <a:srgbClr val="FFFFFF"/>
+                </a:solidFill>
+                <a:latin typeface="Montserrat"/>
               </a:rPr>
               <a:t>.</a:t>
             </a:r>
@@ -4134,112 +4199,6 @@
       </p:pic>
       <p:sp>
         <p:nvSpPr>
-          <p:cNvPr id="19" name="TextBox 19"/>
-          <p:cNvSpPr txBox="1"/>
-          <p:nvPr/>
-        </p:nvSpPr>
-        <p:spPr>
-          <a:xfrm>
-            <a:off x="8458200" y="7955531"/>
-            <a:ext cx="8889551" cy="1384995"/>
-          </a:xfrm>
-          <a:prstGeom prst="rect">
-            <a:avLst/>
-          </a:prstGeom>
-        </p:spPr>
-        <p:txBody>
-          <a:bodyPr wrap="square" lIns="0" tIns="0" rIns="0" bIns="0" rtlCol="0" anchor="t">
-            <a:spAutoFit/>
-          </a:bodyPr>
-          <a:lstStyle/>
-          <a:p>
-            <a:pPr marL="342900" indent="-342900">
-              <a:lnSpc>
-                <a:spcPts val="2700"/>
-              </a:lnSpc>
-              <a:buFontTx/>
-              <a:buChar char="-"/>
-            </a:pPr>
-            <a:r>
-              <a:rPr lang="it-IT" sz="2400" b="0" i="0" dirty="0">
-                <a:solidFill>
-                  <a:schemeClr val="bg1"/>
-                </a:solidFill>
-                <a:effectLst/>
-                <a:latin typeface="Montserrat" panose="00000500000000000000" pitchFamily="2" charset="0"/>
-              </a:rPr>
-              <a:t>Il campo </a:t>
-            </a:r>
-            <a:r>
-              <a:rPr lang="it-IT" sz="2400" b="0" i="0" dirty="0" err="1">
-                <a:solidFill>
-                  <a:schemeClr val="bg1"/>
-                </a:solidFill>
-                <a:effectLst/>
-                <a:latin typeface="Montserrat" panose="00000500000000000000" pitchFamily="2" charset="0"/>
-              </a:rPr>
-              <a:t>watch_next</a:t>
-            </a:r>
-            <a:r>
-              <a:rPr lang="it-IT" sz="2400" b="0" i="0" dirty="0">
-                <a:solidFill>
-                  <a:schemeClr val="bg1"/>
-                </a:solidFill>
-                <a:effectLst/>
-                <a:latin typeface="Montserrat" panose="00000500000000000000" pitchFamily="2" charset="0"/>
-              </a:rPr>
-              <a:t> mostra i video raccomandati come successivi al video corrente</a:t>
-            </a:r>
-          </a:p>
-          <a:p>
-            <a:pPr marL="342900" indent="-342900">
-              <a:lnSpc>
-                <a:spcPts val="2700"/>
-              </a:lnSpc>
-              <a:buFontTx/>
-              <a:buChar char="-"/>
-            </a:pPr>
-            <a:r>
-              <a:rPr lang="it-IT" sz="2400" b="0" i="0" dirty="0">
-                <a:solidFill>
-                  <a:schemeClr val="bg1"/>
-                </a:solidFill>
-                <a:effectLst/>
-                <a:latin typeface="Montserrat" panose="00000500000000000000" pitchFamily="2" charset="0"/>
-              </a:rPr>
-              <a:t>Il campo </a:t>
-            </a:r>
-            <a:r>
-              <a:rPr lang="it-IT" sz="2400" b="0" i="0" dirty="0" err="1">
-                <a:solidFill>
-                  <a:schemeClr val="bg1"/>
-                </a:solidFill>
-                <a:effectLst/>
-                <a:latin typeface="Montserrat" panose="00000500000000000000" pitchFamily="2" charset="0"/>
-              </a:rPr>
-              <a:t>n_wn</a:t>
-            </a:r>
-            <a:r>
-              <a:rPr lang="it-IT" sz="2400" b="0" i="0" dirty="0">
-                <a:solidFill>
-                  <a:schemeClr val="bg1"/>
-                </a:solidFill>
-                <a:effectLst/>
-                <a:latin typeface="Montserrat" panose="00000500000000000000" pitchFamily="2" charset="0"/>
-              </a:rPr>
-              <a:t> tiene traccia del numero di volte in cui il video viene suggerito come successivo in altri video</a:t>
-            </a:r>
-            <a:endParaRPr lang="en-US" sz="2400" dirty="0">
-              <a:solidFill>
-                <a:srgbClr val="FFFFFF"/>
-              </a:solidFill>
-              <a:latin typeface="Montserrat" panose="00000500000000000000" pitchFamily="2" charset="0"/>
-            </a:endParaRPr>
-          </a:p>
-        </p:txBody>
-      </p:sp>
-      <p:sp>
-        <p:nvSpPr>
           <p:cNvPr id="22" name="TextBox 22"/>
           <p:cNvSpPr txBox="1"/>
           <p:nvPr/>
@@ -4299,7 +4258,7 @@
         </p:nvSpPr>
         <p:spPr>
           <a:xfrm>
-            <a:off x="1113431" y="2733903"/>
+            <a:off x="1377255" y="3323817"/>
             <a:ext cx="9339684" cy="1038746"/>
           </a:xfrm>
           <a:prstGeom prst="rect">
@@ -4380,7 +4339,7 @@
                 </a:solidFill>
                 <a:latin typeface="Montserrat" panose="00000500000000000000" pitchFamily="2" charset="0"/>
               </a:rPr>
-              <a:t> e I </a:t>
+              <a:t> e </a:t>
             </a:r>
             <a:r>
               <a:rPr lang="en-US" sz="2400" dirty="0" err="1">
@@ -4389,6 +4348,24 @@
                 </a:solidFill>
                 <a:latin typeface="Montserrat" panose="00000500000000000000" pitchFamily="2" charset="0"/>
               </a:rPr>
+              <a:t>i</a:t>
+            </a:r>
+            <a:r>
+              <a:rPr lang="en-US" sz="2400" dirty="0">
+                <a:solidFill>
+                  <a:schemeClr val="bg1"/>
+                </a:solidFill>
+                <a:latin typeface="Montserrat" panose="00000500000000000000" pitchFamily="2" charset="0"/>
+              </a:rPr>
+              <a:t> </a:t>
+            </a:r>
+            <a:r>
+              <a:rPr lang="en-US" sz="2400" dirty="0" err="1">
+                <a:solidFill>
+                  <a:schemeClr val="bg1"/>
+                </a:solidFill>
+                <a:latin typeface="Montserrat" panose="00000500000000000000" pitchFamily="2" charset="0"/>
+              </a:rPr>
               <a:t>watch_next</a:t>
             </a:r>
             <a:r>
@@ -4515,7 +4492,7 @@
                 </a:solidFill>
                 <a:latin typeface="Montserrat" panose="00000500000000000000" pitchFamily="2" charset="0"/>
               </a:rPr>
-              <a:t>consigliare</a:t>
+              <a:t>consigliarne</a:t>
             </a:r>
             <a:r>
               <a:rPr lang="en-US" sz="2400" dirty="0">
@@ -4524,7 +4501,7 @@
                 </a:solidFill>
                 <a:latin typeface="Montserrat" panose="00000500000000000000" pitchFamily="2" charset="0"/>
               </a:rPr>
-              <a:t> video </a:t>
+              <a:t> </a:t>
             </a:r>
             <a:r>
               <a:rPr lang="en-US" sz="2400" dirty="0" err="1">
@@ -4620,8 +4597,8 @@
         </p:blipFill>
         <p:spPr>
           <a:xfrm>
-            <a:off x="2133600" y="4245024"/>
-            <a:ext cx="14325600" cy="3214919"/>
+            <a:off x="1009608" y="5373549"/>
+            <a:ext cx="16227219" cy="3641676"/>
           </a:xfrm>
           <a:prstGeom prst="rect">
             <a:avLst/>
@@ -4642,6 +4619,607 @@
 </file>
 
 <file path=ppt/slides/slide5.xml><?xml version="1.0" encoding="utf-8"?>
+<p:sld xmlns:a="http://schemas.openxmlformats.org/drawingml/2006/main" xmlns:r="http://schemas.openxmlformats.org/officeDocument/2006/relationships" xmlns:p="http://schemas.openxmlformats.org/presentationml/2006/main">
+  <p:cSld>
+    <p:spTree>
+      <p:nvGrpSpPr>
+        <p:cNvPr id="1" name=""/>
+        <p:cNvGrpSpPr/>
+        <p:nvPr/>
+      </p:nvGrpSpPr>
+      <p:grpSpPr>
+        <a:xfrm>
+          <a:off x="0" y="0"/>
+          <a:ext cx="0" cy="0"/>
+          <a:chOff x="0" y="0"/>
+          <a:chExt cx="0" cy="0"/>
+        </a:xfrm>
+      </p:grpSpPr>
+      <p:pic>
+        <p:nvPicPr>
+          <p:cNvPr id="8" name="Picture 7" descr="Shape, rectangle&#10;&#10;Description automatically generated">
+            <a:extLst>
+              <a:ext uri="{FF2B5EF4-FFF2-40B4-BE49-F238E27FC236}">
+                <a16:creationId xmlns:a16="http://schemas.microsoft.com/office/drawing/2014/main" id="{6BA5A0A7-A0F6-023F-8DF5-5894819FCD32}"/>
+              </a:ext>
+            </a:extLst>
+          </p:cNvPr>
+          <p:cNvPicPr>
+            <a:picLocks noChangeAspect="1"/>
+          </p:cNvPicPr>
+          <p:nvPr/>
+        </p:nvPicPr>
+        <p:blipFill>
+          <a:blip r:embed="rId2" cstate="print">
+            <a:extLst>
+              <a:ext uri="{28A0092B-C50C-407E-A947-70E740481C1C}">
+                <a14:useLocalDpi xmlns:a14="http://schemas.microsoft.com/office/drawing/2010/main" val="0"/>
+              </a:ext>
+            </a:extLst>
+          </a:blip>
+          <a:stretch>
+            <a:fillRect/>
+          </a:stretch>
+        </p:blipFill>
+        <p:spPr>
+          <a:xfrm rot="16200000">
+            <a:off x="3784325" y="7329306"/>
+            <a:ext cx="3463800" cy="1835443"/>
+          </a:xfrm>
+          <a:prstGeom prst="rect">
+            <a:avLst/>
+          </a:prstGeom>
+        </p:spPr>
+      </p:pic>
+      <p:pic>
+        <p:nvPicPr>
+          <p:cNvPr id="2" name="Picture 2"/>
+          <p:cNvPicPr>
+            <a:picLocks noChangeAspect="1"/>
+          </p:cNvPicPr>
+          <p:nvPr/>
+        </p:nvPicPr>
+        <p:blipFill>
+          <a:blip r:embed="rId3"/>
+          <a:srcRect t="21875" b="21875"/>
+          <a:stretch>
+            <a:fillRect/>
+          </a:stretch>
+        </p:blipFill>
+        <p:spPr>
+          <a:xfrm>
+            <a:off x="-20782" y="0"/>
+            <a:ext cx="18288000" cy="10287000"/>
+          </a:xfrm>
+          <a:prstGeom prst="rect">
+            <a:avLst/>
+          </a:prstGeom>
+        </p:spPr>
+      </p:pic>
+      <p:sp>
+        <p:nvSpPr>
+          <p:cNvPr id="22" name="TextBox 22"/>
+          <p:cNvSpPr txBox="1"/>
+          <p:nvPr/>
+        </p:nvSpPr>
+        <p:spPr>
+          <a:xfrm>
+            <a:off x="1377255" y="1269961"/>
+            <a:ext cx="9339684" cy="1090042"/>
+          </a:xfrm>
+          <a:prstGeom prst="rect">
+            <a:avLst/>
+          </a:prstGeom>
+        </p:spPr>
+        <p:txBody>
+          <a:bodyPr wrap="square" lIns="0" tIns="0" rIns="0" bIns="0" rtlCol="0" anchor="t">
+            <a:spAutoFit/>
+          </a:bodyPr>
+          <a:lstStyle/>
+          <a:p>
+            <a:pPr>
+              <a:lnSpc>
+                <a:spcPts val="8487"/>
+              </a:lnSpc>
+            </a:pPr>
+            <a:r>
+              <a:rPr lang="en-US" sz="7716" dirty="0" err="1">
+                <a:solidFill>
+                  <a:srgbClr val="FF914D"/>
+                </a:solidFill>
+                <a:latin typeface="Montserrat Extra-Bold"/>
+              </a:rPr>
+              <a:t>PySpark</a:t>
+            </a:r>
+            <a:r>
+              <a:rPr lang="en-US" sz="7716" dirty="0">
+                <a:solidFill>
+                  <a:srgbClr val="FF914D"/>
+                </a:solidFill>
+                <a:latin typeface="Montserrat Extra-Bold"/>
+              </a:rPr>
+              <a:t> Job</a:t>
+            </a:r>
+          </a:p>
+        </p:txBody>
+      </p:sp>
+      <p:pic>
+        <p:nvPicPr>
+          <p:cNvPr id="5" name="Immagine 4" descr="Immagine che contiene testo, schermata, documento, lettera&#10;&#10;Descrizione generata automaticamente">
+            <a:extLst>
+              <a:ext uri="{FF2B5EF4-FFF2-40B4-BE49-F238E27FC236}">
+                <a16:creationId xmlns:a16="http://schemas.microsoft.com/office/drawing/2014/main" id="{D747CED1-D2FA-449F-590D-FBA0B271CDC9}"/>
+              </a:ext>
+            </a:extLst>
+          </p:cNvPr>
+          <p:cNvPicPr>
+            <a:picLocks noChangeAspect="1"/>
+          </p:cNvPicPr>
+          <p:nvPr/>
+        </p:nvPicPr>
+        <p:blipFill rotWithShape="1">
+          <a:blip r:embed="rId4">
+            <a:extLst>
+              <a:ext uri="{28A0092B-C50C-407E-A947-70E740481C1C}">
+                <a14:useLocalDpi xmlns:a14="http://schemas.microsoft.com/office/drawing/2010/main" val="0"/>
+              </a:ext>
+            </a:extLst>
+          </a:blip>
+          <a:srcRect r="10550" b="13252"/>
+          <a:stretch/>
+        </p:blipFill>
+        <p:spPr>
+          <a:xfrm>
+            <a:off x="771688" y="2587501"/>
+            <a:ext cx="9997857" cy="6975599"/>
+          </a:xfrm>
+          <a:prstGeom prst="rect">
+            <a:avLst/>
+          </a:prstGeom>
+        </p:spPr>
+      </p:pic>
+      <p:sp>
+        <p:nvSpPr>
+          <p:cNvPr id="4" name="TextBox 19">
+            <a:extLst>
+              <a:ext uri="{FF2B5EF4-FFF2-40B4-BE49-F238E27FC236}">
+                <a16:creationId xmlns:a16="http://schemas.microsoft.com/office/drawing/2014/main" id="{A029A638-D177-7F51-1439-3124B4038F6F}"/>
+              </a:ext>
+            </a:extLst>
+          </p:cNvPr>
+          <p:cNvSpPr txBox="1"/>
+          <p:nvPr/>
+        </p:nvSpPr>
+        <p:spPr>
+          <a:xfrm>
+            <a:off x="11266500" y="4344057"/>
+            <a:ext cx="6249812" cy="3462486"/>
+          </a:xfrm>
+          <a:prstGeom prst="rect">
+            <a:avLst/>
+          </a:prstGeom>
+          <a:noFill/>
+        </p:spPr>
+        <p:txBody>
+          <a:bodyPr wrap="square" lIns="0" tIns="0" rIns="0" bIns="0" rtlCol="0" anchor="t">
+            <a:spAutoFit/>
+          </a:bodyPr>
+          <a:lstStyle/>
+          <a:p>
+            <a:pPr marL="342900" indent="-342900">
+              <a:lnSpc>
+                <a:spcPts val="2700"/>
+              </a:lnSpc>
+              <a:buFontTx/>
+              <a:buChar char="-"/>
+            </a:pPr>
+            <a:r>
+              <a:rPr lang="it-IT" sz="2400" b="0" i="0" dirty="0">
+                <a:solidFill>
+                  <a:schemeClr val="bg1"/>
+                </a:solidFill>
+                <a:effectLst/>
+                <a:latin typeface="Montserrat" panose="00000500000000000000" pitchFamily="2" charset="0"/>
+              </a:rPr>
+              <a:t>Il campo </a:t>
+            </a:r>
+            <a:r>
+              <a:rPr lang="it-IT" sz="2400" b="0" i="0" dirty="0" err="1">
+                <a:solidFill>
+                  <a:schemeClr val="bg1"/>
+                </a:solidFill>
+                <a:effectLst/>
+                <a:latin typeface="Montserrat" panose="00000500000000000000" pitchFamily="2" charset="0"/>
+              </a:rPr>
+              <a:t>watch_next</a:t>
+            </a:r>
+            <a:r>
+              <a:rPr lang="it-IT" sz="2400" b="0" i="0" dirty="0">
+                <a:solidFill>
+                  <a:schemeClr val="bg1"/>
+                </a:solidFill>
+                <a:effectLst/>
+                <a:latin typeface="Montserrat" panose="00000500000000000000" pitchFamily="2" charset="0"/>
+              </a:rPr>
+              <a:t> mostra un array di video raccomandati come successivi al video corrente</a:t>
+            </a:r>
+          </a:p>
+          <a:p>
+            <a:pPr marL="342900" indent="-342900">
+              <a:lnSpc>
+                <a:spcPts val="2700"/>
+              </a:lnSpc>
+              <a:buFontTx/>
+              <a:buChar char="-"/>
+            </a:pPr>
+            <a:r>
+              <a:rPr lang="it-IT" sz="2400" b="0" i="0" dirty="0">
+                <a:solidFill>
+                  <a:schemeClr val="bg1"/>
+                </a:solidFill>
+                <a:effectLst/>
+                <a:latin typeface="Montserrat" panose="00000500000000000000" pitchFamily="2" charset="0"/>
+              </a:rPr>
+              <a:t>Il campo </a:t>
+            </a:r>
+            <a:r>
+              <a:rPr lang="it-IT" sz="2400" b="0" i="0" dirty="0" err="1">
+                <a:solidFill>
+                  <a:schemeClr val="bg1"/>
+                </a:solidFill>
+                <a:effectLst/>
+                <a:latin typeface="Montserrat" panose="00000500000000000000" pitchFamily="2" charset="0"/>
+              </a:rPr>
+              <a:t>n_wn</a:t>
+            </a:r>
+            <a:r>
+              <a:rPr lang="it-IT" sz="2400" b="0" i="0" dirty="0">
+                <a:solidFill>
+                  <a:schemeClr val="bg1"/>
+                </a:solidFill>
+                <a:effectLst/>
+                <a:latin typeface="Montserrat" panose="00000500000000000000" pitchFamily="2" charset="0"/>
+              </a:rPr>
+              <a:t> tiene traccia del numero di volte in cui il video viene suggerito come successivo in altri video;</a:t>
+            </a:r>
+            <a:r>
+              <a:rPr lang="en-US" sz="2400" b="0" i="0" dirty="0">
+                <a:solidFill>
+                  <a:srgbClr val="FFFFFF"/>
+                </a:solidFill>
+                <a:effectLst/>
+                <a:latin typeface="Montserrat" panose="00000500000000000000" pitchFamily="2" charset="0"/>
+              </a:rPr>
+              <a:t> un </a:t>
+            </a:r>
+            <a:r>
+              <a:rPr lang="en-US" sz="2400" b="0" i="0" dirty="0" err="1">
+                <a:solidFill>
+                  <a:srgbClr val="FFFFFF"/>
+                </a:solidFill>
+                <a:effectLst/>
+                <a:latin typeface="Montserrat" panose="00000500000000000000" pitchFamily="2" charset="0"/>
+              </a:rPr>
+              <a:t>valore</a:t>
+            </a:r>
+            <a:r>
+              <a:rPr lang="en-US" sz="2400" b="0" i="0" dirty="0">
+                <a:solidFill>
+                  <a:srgbClr val="FFFFFF"/>
+                </a:solidFill>
+                <a:effectLst/>
+                <a:latin typeface="Montserrat" panose="00000500000000000000" pitchFamily="2" charset="0"/>
+              </a:rPr>
+              <a:t> alto </a:t>
+            </a:r>
+            <a:r>
+              <a:rPr lang="en-US" sz="2400" b="0" i="0" dirty="0" err="1">
+                <a:solidFill>
+                  <a:srgbClr val="FFFFFF"/>
+                </a:solidFill>
+                <a:effectLst/>
+                <a:latin typeface="Montserrat" panose="00000500000000000000" pitchFamily="2" charset="0"/>
+              </a:rPr>
+              <a:t>denota</a:t>
+            </a:r>
+            <a:r>
+              <a:rPr lang="en-US" sz="2400" b="0" i="0" dirty="0">
+                <a:solidFill>
+                  <a:srgbClr val="FFFFFF"/>
+                </a:solidFill>
+                <a:effectLst/>
+                <a:latin typeface="Montserrat" panose="00000500000000000000" pitchFamily="2" charset="0"/>
+              </a:rPr>
+              <a:t> </a:t>
+            </a:r>
+            <a:r>
+              <a:rPr lang="en-US" sz="2400" dirty="0" err="1">
+                <a:solidFill>
+                  <a:srgbClr val="FFFFFF"/>
+                </a:solidFill>
+                <a:latin typeface="Montserrat" panose="00000500000000000000" pitchFamily="2" charset="0"/>
+              </a:rPr>
+              <a:t>un’ampia</a:t>
+            </a:r>
+            <a:r>
+              <a:rPr lang="en-US" sz="2400" dirty="0">
+                <a:solidFill>
+                  <a:srgbClr val="FFFFFF"/>
+                </a:solidFill>
+                <a:latin typeface="Montserrat" panose="00000500000000000000" pitchFamily="2" charset="0"/>
+              </a:rPr>
+              <a:t> </a:t>
+            </a:r>
+            <a:r>
+              <a:rPr lang="en-US" sz="2400" dirty="0" err="1">
+                <a:solidFill>
+                  <a:srgbClr val="FFFFFF"/>
+                </a:solidFill>
+                <a:latin typeface="Montserrat" panose="00000500000000000000" pitchFamily="2" charset="0"/>
+              </a:rPr>
+              <a:t>categoria</a:t>
+            </a:r>
+            <a:r>
+              <a:rPr lang="en-US" sz="2400" dirty="0">
+                <a:solidFill>
+                  <a:srgbClr val="FFFFFF"/>
+                </a:solidFill>
+                <a:latin typeface="Montserrat" panose="00000500000000000000" pitchFamily="2" charset="0"/>
+              </a:rPr>
+              <a:t> di video </a:t>
+            </a:r>
+            <a:r>
+              <a:rPr lang="en-US" sz="2400" dirty="0" err="1">
+                <a:solidFill>
+                  <a:srgbClr val="FFFFFF"/>
+                </a:solidFill>
+                <a:latin typeface="Montserrat" panose="00000500000000000000" pitchFamily="2" charset="0"/>
+              </a:rPr>
+              <a:t>dello</a:t>
+            </a:r>
+            <a:r>
+              <a:rPr lang="en-US" sz="2400" dirty="0">
+                <a:solidFill>
+                  <a:srgbClr val="FFFFFF"/>
+                </a:solidFill>
+                <a:latin typeface="Montserrat" panose="00000500000000000000" pitchFamily="2" charset="0"/>
+              </a:rPr>
+              <a:t> </a:t>
+            </a:r>
+            <a:r>
+              <a:rPr lang="en-US" sz="2400" dirty="0" err="1">
+                <a:solidFill>
+                  <a:srgbClr val="FFFFFF"/>
+                </a:solidFill>
+                <a:latin typeface="Montserrat" panose="00000500000000000000" pitchFamily="2" charset="0"/>
+              </a:rPr>
+              <a:t>stesso</a:t>
+            </a:r>
+            <a:r>
+              <a:rPr lang="en-US" sz="2400" dirty="0">
+                <a:solidFill>
+                  <a:srgbClr val="FFFFFF"/>
+                </a:solidFill>
+                <a:latin typeface="Montserrat" panose="00000500000000000000" pitchFamily="2" charset="0"/>
+              </a:rPr>
+              <a:t> </a:t>
+            </a:r>
+            <a:r>
+              <a:rPr lang="en-US" sz="2400" dirty="0" err="1">
+                <a:solidFill>
+                  <a:srgbClr val="FFFFFF"/>
+                </a:solidFill>
+                <a:latin typeface="Montserrat" panose="00000500000000000000" pitchFamily="2" charset="0"/>
+              </a:rPr>
+              <a:t>argomento</a:t>
+            </a:r>
+            <a:r>
+              <a:rPr lang="en-US" sz="2400" dirty="0">
+                <a:solidFill>
+                  <a:srgbClr val="FFFFFF"/>
+                </a:solidFill>
+                <a:latin typeface="Montserrat" panose="00000500000000000000" pitchFamily="2" charset="0"/>
+              </a:rPr>
+              <a:t>, o </a:t>
+            </a:r>
+            <a:r>
+              <a:rPr lang="en-US" sz="2400" dirty="0" err="1">
+                <a:solidFill>
+                  <a:srgbClr val="FFFFFF"/>
+                </a:solidFill>
+                <a:latin typeface="Montserrat" panose="00000500000000000000" pitchFamily="2" charset="0"/>
+              </a:rPr>
+              <a:t>una</a:t>
+            </a:r>
+            <a:r>
+              <a:rPr lang="en-US" sz="2400" dirty="0">
+                <a:solidFill>
+                  <a:srgbClr val="FFFFFF"/>
+                </a:solidFill>
+                <a:latin typeface="Montserrat" panose="00000500000000000000" pitchFamily="2" charset="0"/>
+              </a:rPr>
+              <a:t> </a:t>
+            </a:r>
+            <a:r>
+              <a:rPr lang="en-US" sz="2400" dirty="0" err="1">
+                <a:solidFill>
+                  <a:srgbClr val="FFFFFF"/>
+                </a:solidFill>
+                <a:latin typeface="Montserrat" panose="00000500000000000000" pitchFamily="2" charset="0"/>
+              </a:rPr>
+              <a:t>poca</a:t>
+            </a:r>
+            <a:r>
+              <a:rPr lang="en-US" sz="2400" dirty="0">
+                <a:solidFill>
+                  <a:srgbClr val="FFFFFF"/>
+                </a:solidFill>
+                <a:latin typeface="Montserrat" panose="00000500000000000000" pitchFamily="2" charset="0"/>
+              </a:rPr>
+              <a:t> </a:t>
+            </a:r>
+            <a:r>
+              <a:rPr lang="en-US" sz="2400" dirty="0" err="1">
+                <a:solidFill>
+                  <a:srgbClr val="FFFFFF"/>
+                </a:solidFill>
+                <a:latin typeface="Montserrat" panose="00000500000000000000" pitchFamily="2" charset="0"/>
+              </a:rPr>
+              <a:t>precisione</a:t>
+            </a:r>
+            <a:r>
+              <a:rPr lang="en-US" sz="2400" dirty="0">
+                <a:solidFill>
+                  <a:srgbClr val="FFFFFF"/>
+                </a:solidFill>
+                <a:latin typeface="Montserrat" panose="00000500000000000000" pitchFamily="2" charset="0"/>
+              </a:rPr>
+              <a:t> </a:t>
+            </a:r>
+            <a:r>
+              <a:rPr lang="en-US" sz="2400" dirty="0" err="1">
+                <a:solidFill>
+                  <a:srgbClr val="FFFFFF"/>
+                </a:solidFill>
+                <a:latin typeface="Montserrat" panose="00000500000000000000" pitchFamily="2" charset="0"/>
+              </a:rPr>
+              <a:t>dei</a:t>
+            </a:r>
+            <a:r>
+              <a:rPr lang="en-US" sz="2400" dirty="0">
+                <a:solidFill>
+                  <a:srgbClr val="FFFFFF"/>
+                </a:solidFill>
+                <a:latin typeface="Montserrat" panose="00000500000000000000" pitchFamily="2" charset="0"/>
+              </a:rPr>
+              <a:t> tag</a:t>
+            </a:r>
+            <a:endParaRPr lang="it-IT" sz="2400" b="0" i="0" dirty="0">
+              <a:solidFill>
+                <a:schemeClr val="bg1"/>
+              </a:solidFill>
+              <a:effectLst/>
+              <a:latin typeface="Montserrat" panose="00000500000000000000" pitchFamily="2" charset="0"/>
+            </a:endParaRPr>
+          </a:p>
+        </p:txBody>
+      </p:sp>
+      <mc:AlternateContent xmlns:mc="http://schemas.openxmlformats.org/markup-compatibility/2006">
+        <mc:Choice xmlns:p14="http://schemas.microsoft.com/office/powerpoint/2010/main" Requires="p14">
+          <p:contentPart p14:bwMode="auto" r:id="rId5">
+            <p14:nvContentPartPr>
+              <p14:cNvPr id="12" name="Input penna 11">
+                <a:extLst>
+                  <a:ext uri="{FF2B5EF4-FFF2-40B4-BE49-F238E27FC236}">
+                    <a16:creationId xmlns:a16="http://schemas.microsoft.com/office/drawing/2014/main" id="{00E2499C-90BC-1B2A-31BF-85A48A3EEA54}"/>
+                  </a:ext>
+                </a:extLst>
+              </p14:cNvPr>
+              <p14:cNvContentPartPr/>
+              <p14:nvPr/>
+            </p14:nvContentPartPr>
+            <p14:xfrm>
+              <a:off x="1233560" y="7510606"/>
+              <a:ext cx="1300680" cy="360"/>
+            </p14:xfrm>
+          </p:contentPart>
+        </mc:Choice>
+        <mc:Fallback>
+          <p:pic>
+            <p:nvPicPr>
+              <p:cNvPr id="12" name="Input penna 11">
+                <a:extLst>
+                  <a:ext uri="{FF2B5EF4-FFF2-40B4-BE49-F238E27FC236}">
+                    <a16:creationId xmlns:a16="http://schemas.microsoft.com/office/drawing/2014/main" id="{00E2499C-90BC-1B2A-31BF-85A48A3EEA54}"/>
+                  </a:ext>
+                </a:extLst>
+              </p:cNvPr>
+              <p:cNvPicPr/>
+              <p:nvPr/>
+            </p:nvPicPr>
+            <p:blipFill>
+              <a:blip r:embed="rId6"/>
+              <a:stretch>
+                <a:fillRect/>
+              </a:stretch>
+            </p:blipFill>
+            <p:spPr>
+              <a:xfrm>
+                <a:off x="1179560" y="7402606"/>
+                <a:ext cx="1408320" cy="216000"/>
+              </a:xfrm>
+              <a:prstGeom prst="rect">
+                <a:avLst/>
+              </a:prstGeom>
+            </p:spPr>
+          </p:pic>
+        </mc:Fallback>
+      </mc:AlternateContent>
+      <mc:AlternateContent xmlns:mc="http://schemas.openxmlformats.org/markup-compatibility/2006">
+        <mc:Choice xmlns:p14="http://schemas.microsoft.com/office/powerpoint/2010/main" Requires="p14">
+          <p:contentPart p14:bwMode="auto" r:id="rId7">
+            <p14:nvContentPartPr>
+              <p14:cNvPr id="13" name="Input penna 12">
+                <a:extLst>
+                  <a:ext uri="{FF2B5EF4-FFF2-40B4-BE49-F238E27FC236}">
+                    <a16:creationId xmlns:a16="http://schemas.microsoft.com/office/drawing/2014/main" id="{45BF8769-27E9-B647-839C-5305CDAA296D}"/>
+                  </a:ext>
+                </a:extLst>
+              </p14:cNvPr>
+              <p14:cNvContentPartPr/>
+              <p14:nvPr/>
+            </p14:nvContentPartPr>
+            <p14:xfrm>
+              <a:off x="1306280" y="7249246"/>
+              <a:ext cx="477000" cy="360"/>
+            </p14:xfrm>
+          </p:contentPart>
+        </mc:Choice>
+        <mc:Fallback>
+          <p:pic>
+            <p:nvPicPr>
+              <p:cNvPr id="13" name="Input penna 12">
+                <a:extLst>
+                  <a:ext uri="{FF2B5EF4-FFF2-40B4-BE49-F238E27FC236}">
+                    <a16:creationId xmlns:a16="http://schemas.microsoft.com/office/drawing/2014/main" id="{45BF8769-27E9-B647-839C-5305CDAA296D}"/>
+                  </a:ext>
+                </a:extLst>
+              </p:cNvPr>
+              <p:cNvPicPr/>
+              <p:nvPr/>
+            </p:nvPicPr>
+            <p:blipFill>
+              <a:blip r:embed="rId8"/>
+              <a:stretch>
+                <a:fillRect/>
+              </a:stretch>
+            </p:blipFill>
+            <p:spPr>
+              <a:xfrm>
+                <a:off x="1252280" y="7141246"/>
+                <a:ext cx="584640" cy="216000"/>
+              </a:xfrm>
+              <a:prstGeom prst="rect">
+                <a:avLst/>
+              </a:prstGeom>
+            </p:spPr>
+          </p:pic>
+        </mc:Fallback>
+      </mc:AlternateContent>
+    </p:spTree>
+    <p:extLst>
+      <p:ext uri="{BB962C8B-B14F-4D97-AF65-F5344CB8AC3E}">
+        <p14:creationId xmlns:p14="http://schemas.microsoft.com/office/powerpoint/2010/main" val="2195706302"/>
+      </p:ext>
+    </p:extLst>
+  </p:cSld>
+  <p:clrMapOvr>
+    <a:masterClrMapping/>
+  </p:clrMapOvr>
+</p:sld>
+</file>
+
+<file path=ppt/slides/slide6.xml><?xml version="1.0" encoding="utf-8"?>
 <p:sld xmlns:a="http://schemas.openxmlformats.org/drawingml/2006/main" xmlns:r="http://schemas.openxmlformats.org/officeDocument/2006/relationships" xmlns:p="http://schemas.openxmlformats.org/presentationml/2006/main">
   <p:cSld>
     <p:spTree>
@@ -4790,8 +5368,23 @@
                 </a:solidFill>
                 <a:latin typeface="Montserrat Extra-Bold"/>
               </a:rPr>
-              <a:t> Growth</a:t>
-            </a:r>
+              <a:t> </a:t>
+            </a:r>
+            <a:r>
+              <a:rPr lang="en-US" sz="8256" dirty="0" err="1">
+                <a:solidFill>
+                  <a:srgbClr val="FF914D"/>
+                </a:solidFill>
+                <a:latin typeface="Montserrat Extra-Bold"/>
+              </a:rPr>
+              <a:t>Evoluzioni</a:t>
+            </a:r>
+            <a:endParaRPr lang="en-US" sz="8256" dirty="0">
+              <a:solidFill>
+                <a:srgbClr val="FF914D"/>
+              </a:solidFill>
+              <a:latin typeface="Montserrat Extra-Bold"/>
+            </a:endParaRPr>
           </a:p>
         </p:txBody>
       </p:sp>
@@ -4907,7 +5500,7 @@
 </p:sld>
 </file>
 
-<file path=ppt/slides/slide6.xml><?xml version="1.0" encoding="utf-8"?>
+<file path=ppt/slides/slide7.xml><?xml version="1.0" encoding="utf-8"?>
 <p:sld xmlns:a="http://schemas.openxmlformats.org/drawingml/2006/main" xmlns:r="http://schemas.openxmlformats.org/officeDocument/2006/relationships" xmlns:p="http://schemas.openxmlformats.org/presentationml/2006/main">
   <p:cSld>
     <p:spTree>
@@ -5071,7 +5664,7 @@
 </p:sld>
 </file>
 
-<file path=ppt/slides/slide7.xml><?xml version="1.0" encoding="utf-8"?>
+<file path=ppt/slides/slide8.xml><?xml version="1.0" encoding="utf-8"?>
 <p:sld xmlns:a="http://schemas.openxmlformats.org/drawingml/2006/main" xmlns:r="http://schemas.openxmlformats.org/officeDocument/2006/relationships" xmlns:p="http://schemas.openxmlformats.org/presentationml/2006/main">
   <p:cSld>
     <p:spTree>

</xml_diff>

<commit_message>
Update Homework pt. 2 slides
</commit_message>
<xml_diff>
--- a/Slides/Homework #2.pptx
+++ b/Slides/Homework #2.pptx
@@ -435,7 +435,7 @@
             <a:fld id="{B6F15528-21DE-4FAA-801E-634DDDAF4B2B}" type="slidenum">
               <a:rPr lang="en-US" smtClean="0"/>
               <a:pPr/>
-              <a:t>‹N›</a:t>
+              <a:t>‹#›</a:t>
             </a:fld>
             <a:endParaRPr lang="en-US"/>
           </a:p>
@@ -600,7 +600,7 @@
             <a:fld id="{B6F15528-21DE-4FAA-801E-634DDDAF4B2B}" type="slidenum">
               <a:rPr lang="en-US" smtClean="0"/>
               <a:pPr/>
-              <a:t>‹N›</a:t>
+              <a:t>‹#›</a:t>
             </a:fld>
             <a:endParaRPr lang="en-US"/>
           </a:p>
@@ -775,7 +775,7 @@
             <a:fld id="{B6F15528-21DE-4FAA-801E-634DDDAF4B2B}" type="slidenum">
               <a:rPr lang="en-US" smtClean="0"/>
               <a:pPr/>
-              <a:t>‹N›</a:t>
+              <a:t>‹#›</a:t>
             </a:fld>
             <a:endParaRPr lang="en-US"/>
           </a:p>
@@ -940,7 +940,7 @@
             <a:fld id="{B6F15528-21DE-4FAA-801E-634DDDAF4B2B}" type="slidenum">
               <a:rPr lang="en-US" smtClean="0"/>
               <a:pPr/>
-              <a:t>‹N›</a:t>
+              <a:t>‹#›</a:t>
             </a:fld>
             <a:endParaRPr lang="en-US"/>
           </a:p>
@@ -1182,7 +1182,7 @@
             <a:fld id="{B6F15528-21DE-4FAA-801E-634DDDAF4B2B}" type="slidenum">
               <a:rPr lang="en-US" smtClean="0"/>
               <a:pPr/>
-              <a:t>‹N›</a:t>
+              <a:t>‹#›</a:t>
             </a:fld>
             <a:endParaRPr lang="en-US"/>
           </a:p>
@@ -1464,7 +1464,7 @@
             <a:fld id="{B6F15528-21DE-4FAA-801E-634DDDAF4B2B}" type="slidenum">
               <a:rPr lang="en-US" smtClean="0"/>
               <a:pPr/>
-              <a:t>‹N›</a:t>
+              <a:t>‹#›</a:t>
             </a:fld>
             <a:endParaRPr lang="en-US"/>
           </a:p>
@@ -1880,7 +1880,7 @@
             <a:fld id="{B6F15528-21DE-4FAA-801E-634DDDAF4B2B}" type="slidenum">
               <a:rPr lang="en-US" smtClean="0"/>
               <a:pPr/>
-              <a:t>‹N›</a:t>
+              <a:t>‹#›</a:t>
             </a:fld>
             <a:endParaRPr lang="en-US"/>
           </a:p>
@@ -1994,7 +1994,7 @@
             <a:fld id="{B6F15528-21DE-4FAA-801E-634DDDAF4B2B}" type="slidenum">
               <a:rPr lang="en-US" smtClean="0"/>
               <a:pPr/>
-              <a:t>‹N›</a:t>
+              <a:t>‹#›</a:t>
             </a:fld>
             <a:endParaRPr lang="en-US"/>
           </a:p>
@@ -2086,7 +2086,7 @@
             <a:fld id="{B6F15528-21DE-4FAA-801E-634DDDAF4B2B}" type="slidenum">
               <a:rPr lang="en-US" smtClean="0"/>
               <a:pPr/>
-              <a:t>‹N›</a:t>
+              <a:t>‹#›</a:t>
             </a:fld>
             <a:endParaRPr lang="en-US"/>
           </a:p>
@@ -2358,7 +2358,7 @@
             <a:fld id="{B6F15528-21DE-4FAA-801E-634DDDAF4B2B}" type="slidenum">
               <a:rPr lang="en-US" smtClean="0"/>
               <a:pPr/>
-              <a:t>‹N›</a:t>
+              <a:t>‹#›</a:t>
             </a:fld>
             <a:endParaRPr lang="en-US"/>
           </a:p>
@@ -2607,7 +2607,7 @@
             <a:fld id="{B6F15528-21DE-4FAA-801E-634DDDAF4B2B}" type="slidenum">
               <a:rPr lang="en-US" smtClean="0"/>
               <a:pPr/>
-              <a:t>‹N›</a:t>
+              <a:t>‹#›</a:t>
             </a:fld>
             <a:endParaRPr lang="en-US"/>
           </a:p>
@@ -2851,7 +2851,7 @@
             <a:fld id="{B6F15528-21DE-4FAA-801E-634DDDAF4B2B}" type="slidenum">
               <a:rPr lang="en-US" smtClean="0"/>
               <a:pPr/>
-              <a:t>‹N›</a:t>
+              <a:t>‹#›</a:t>
             </a:fld>
             <a:endParaRPr lang="en-US"/>
           </a:p>
@@ -3699,8 +3699,8 @@
         </p:blipFill>
         <p:spPr>
           <a:xfrm>
-            <a:off x="12649200" y="5448300"/>
-            <a:ext cx="2977085" cy="2993413"/>
+            <a:off x="12496800" y="5926420"/>
+            <a:ext cx="4114800" cy="4137368"/>
           </a:xfrm>
           <a:prstGeom prst="rect">
             <a:avLst/>
@@ -3739,42 +3739,6 @@
       </p:grpSpPr>
       <p:pic>
         <p:nvPicPr>
-          <p:cNvPr id="8" name="Picture 7" descr="Shape, rectangle&#10;&#10;Description automatically generated">
-            <a:extLst>
-              <a:ext uri="{FF2B5EF4-FFF2-40B4-BE49-F238E27FC236}">
-                <a16:creationId xmlns:a16="http://schemas.microsoft.com/office/drawing/2014/main" id="{6BA5A0A7-A0F6-023F-8DF5-5894819FCD32}"/>
-              </a:ext>
-            </a:extLst>
-          </p:cNvPr>
-          <p:cNvPicPr>
-            <a:picLocks noChangeAspect="1"/>
-          </p:cNvPicPr>
-          <p:nvPr/>
-        </p:nvPicPr>
-        <p:blipFill>
-          <a:blip r:embed="rId2" cstate="print">
-            <a:extLst>
-              <a:ext uri="{28A0092B-C50C-407E-A947-70E740481C1C}">
-                <a14:useLocalDpi xmlns:a14="http://schemas.microsoft.com/office/drawing/2010/main" val="0"/>
-              </a:ext>
-            </a:extLst>
-          </a:blip>
-          <a:stretch>
-            <a:fillRect/>
-          </a:stretch>
-        </p:blipFill>
-        <p:spPr>
-          <a:xfrm rot="16200000">
-            <a:off x="3784325" y="7329306"/>
-            <a:ext cx="3463800" cy="1835443"/>
-          </a:xfrm>
-          <a:prstGeom prst="rect">
-            <a:avLst/>
-          </a:prstGeom>
-        </p:spPr>
-      </p:pic>
-      <p:pic>
-        <p:nvPicPr>
           <p:cNvPr id="2" name="Picture 2"/>
           <p:cNvPicPr>
             <a:picLocks noChangeAspect="1"/>
@@ -3782,7 +3746,7 @@
           <p:nvPr/>
         </p:nvPicPr>
         <p:blipFill>
-          <a:blip r:embed="rId3"/>
+          <a:blip r:embed="rId2"/>
           <a:srcRect t="21875" b="21875"/>
           <a:stretch>
             <a:fillRect/>
@@ -3800,6 +3764,98 @@
       </p:pic>
       <p:sp>
         <p:nvSpPr>
+          <p:cNvPr id="4" name="Rectangle 3">
+            <a:extLst>
+              <a:ext uri="{FF2B5EF4-FFF2-40B4-BE49-F238E27FC236}">
+                <a16:creationId xmlns:a16="http://schemas.microsoft.com/office/drawing/2014/main" id="{4EEC1AD7-B59A-5498-F61F-70DCCC41553E}"/>
+              </a:ext>
+            </a:extLst>
+          </p:cNvPr>
+          <p:cNvSpPr/>
+          <p:nvPr/>
+        </p:nvSpPr>
+        <p:spPr>
+          <a:xfrm>
+            <a:off x="990600" y="5981700"/>
+            <a:ext cx="10134600" cy="2209800"/>
+          </a:xfrm>
+          <a:prstGeom prst="rect">
+            <a:avLst/>
+          </a:prstGeom>
+        </p:spPr>
+        <p:style>
+          <a:lnRef idx="2">
+            <a:schemeClr val="accent6">
+              <a:shade val="50000"/>
+            </a:schemeClr>
+          </a:lnRef>
+          <a:fillRef idx="1">
+            <a:schemeClr val="accent6"/>
+          </a:fillRef>
+          <a:effectRef idx="0">
+            <a:schemeClr val="accent6"/>
+          </a:effectRef>
+          <a:fontRef idx="minor">
+            <a:schemeClr val="lt1"/>
+          </a:fontRef>
+        </p:style>
+        <p:txBody>
+          <a:bodyPr rtlCol="0" anchor="ctr"/>
+          <a:lstStyle/>
+          <a:p>
+            <a:pPr algn="ctr"/>
+            <a:endParaRPr lang="it-IT"/>
+          </a:p>
+        </p:txBody>
+      </p:sp>
+      <p:sp>
+        <p:nvSpPr>
+          <p:cNvPr id="3" name="Rectangle 2">
+            <a:extLst>
+              <a:ext uri="{FF2B5EF4-FFF2-40B4-BE49-F238E27FC236}">
+                <a16:creationId xmlns:a16="http://schemas.microsoft.com/office/drawing/2014/main" id="{A9C84F63-282A-28D0-3632-CFE3372F7091}"/>
+              </a:ext>
+            </a:extLst>
+          </p:cNvPr>
+          <p:cNvSpPr/>
+          <p:nvPr/>
+        </p:nvSpPr>
+        <p:spPr>
+          <a:xfrm>
+            <a:off x="9067800" y="2705100"/>
+            <a:ext cx="7772400" cy="2133600"/>
+          </a:xfrm>
+          <a:prstGeom prst="rect">
+            <a:avLst/>
+          </a:prstGeom>
+        </p:spPr>
+        <p:style>
+          <a:lnRef idx="2">
+            <a:schemeClr val="accent6">
+              <a:shade val="50000"/>
+            </a:schemeClr>
+          </a:lnRef>
+          <a:fillRef idx="1">
+            <a:schemeClr val="accent6"/>
+          </a:fillRef>
+          <a:effectRef idx="0">
+            <a:schemeClr val="accent6"/>
+          </a:effectRef>
+          <a:fontRef idx="minor">
+            <a:schemeClr val="lt1"/>
+          </a:fontRef>
+        </p:style>
+        <p:txBody>
+          <a:bodyPr rtlCol="0" anchor="ctr"/>
+          <a:lstStyle/>
+          <a:p>
+            <a:pPr algn="ctr"/>
+            <a:endParaRPr lang="it-IT"/>
+          </a:p>
+        </p:txBody>
+      </p:sp>
+      <p:sp>
+        <p:nvSpPr>
           <p:cNvPr id="19" name="TextBox 19"/>
           <p:cNvSpPr txBox="1"/>
           <p:nvPr/>
@@ -3956,7 +4012,7 @@
           <p:nvPr/>
         </p:nvPicPr>
         <p:blipFill>
-          <a:blip r:embed="rId4">
+          <a:blip r:embed="rId3">
             <a:extLst>
               <a:ext uri="{28A0092B-C50C-407E-A947-70E740481C1C}">
                 <a14:useLocalDpi xmlns:a14="http://schemas.microsoft.com/office/drawing/2010/main" val="0"/>
@@ -3992,7 +4048,7 @@
           <p:nvPr/>
         </p:nvPicPr>
         <p:blipFill>
-          <a:blip r:embed="rId5">
+          <a:blip r:embed="rId4">
             <a:extLst>
               <a:ext uri="{28A0092B-C50C-407E-A947-70E740481C1C}">
                 <a14:useLocalDpi xmlns:a14="http://schemas.microsoft.com/office/drawing/2010/main" val="0"/>
@@ -4138,42 +4194,6 @@
       </p:grpSpPr>
       <p:pic>
         <p:nvPicPr>
-          <p:cNvPr id="8" name="Picture 7" descr="Shape, rectangle&#10;&#10;Description automatically generated">
-            <a:extLst>
-              <a:ext uri="{FF2B5EF4-FFF2-40B4-BE49-F238E27FC236}">
-                <a16:creationId xmlns:a16="http://schemas.microsoft.com/office/drawing/2014/main" id="{6BA5A0A7-A0F6-023F-8DF5-5894819FCD32}"/>
-              </a:ext>
-            </a:extLst>
-          </p:cNvPr>
-          <p:cNvPicPr>
-            <a:picLocks noChangeAspect="1"/>
-          </p:cNvPicPr>
-          <p:nvPr/>
-        </p:nvPicPr>
-        <p:blipFill>
-          <a:blip r:embed="rId2" cstate="print">
-            <a:extLst>
-              <a:ext uri="{28A0092B-C50C-407E-A947-70E740481C1C}">
-                <a14:useLocalDpi xmlns:a14="http://schemas.microsoft.com/office/drawing/2010/main" val="0"/>
-              </a:ext>
-            </a:extLst>
-          </a:blip>
-          <a:stretch>
-            <a:fillRect/>
-          </a:stretch>
-        </p:blipFill>
-        <p:spPr>
-          <a:xfrm rot="16200000">
-            <a:off x="3784325" y="7329306"/>
-            <a:ext cx="3463800" cy="1835443"/>
-          </a:xfrm>
-          <a:prstGeom prst="rect">
-            <a:avLst/>
-          </a:prstGeom>
-        </p:spPr>
-      </p:pic>
-      <p:pic>
-        <p:nvPicPr>
           <p:cNvPr id="2" name="Picture 2"/>
           <p:cNvPicPr>
             <a:picLocks noChangeAspect="1"/>
@@ -4181,7 +4201,7 @@
           <p:nvPr/>
         </p:nvPicPr>
         <p:blipFill>
-          <a:blip r:embed="rId3"/>
+          <a:blip r:embed="rId2"/>
           <a:srcRect t="21875" b="21875"/>
           <a:stretch>
             <a:fillRect/>
@@ -4199,6 +4219,52 @@
       </p:pic>
       <p:sp>
         <p:nvSpPr>
+          <p:cNvPr id="4" name="Rectangle 3">
+            <a:extLst>
+              <a:ext uri="{FF2B5EF4-FFF2-40B4-BE49-F238E27FC236}">
+                <a16:creationId xmlns:a16="http://schemas.microsoft.com/office/drawing/2014/main" id="{E1C50163-E629-1E96-B615-4F072C4A819B}"/>
+              </a:ext>
+            </a:extLst>
+          </p:cNvPr>
+          <p:cNvSpPr/>
+          <p:nvPr/>
+        </p:nvSpPr>
+        <p:spPr>
+          <a:xfrm>
+            <a:off x="762000" y="5448300"/>
+            <a:ext cx="16764000" cy="3962399"/>
+          </a:xfrm>
+          <a:prstGeom prst="rect">
+            <a:avLst/>
+          </a:prstGeom>
+        </p:spPr>
+        <p:style>
+          <a:lnRef idx="2">
+            <a:schemeClr val="accent6">
+              <a:shade val="50000"/>
+            </a:schemeClr>
+          </a:lnRef>
+          <a:fillRef idx="1">
+            <a:schemeClr val="accent6"/>
+          </a:fillRef>
+          <a:effectRef idx="0">
+            <a:schemeClr val="accent6"/>
+          </a:effectRef>
+          <a:fontRef idx="minor">
+            <a:schemeClr val="lt1"/>
+          </a:fontRef>
+        </p:style>
+        <p:txBody>
+          <a:bodyPr rtlCol="0" anchor="ctr"/>
+          <a:lstStyle/>
+          <a:p>
+            <a:pPr algn="ctr"/>
+            <a:endParaRPr lang="it-IT"/>
+          </a:p>
+        </p:txBody>
+      </p:sp>
+      <p:sp>
+        <p:nvSpPr>
           <p:cNvPr id="22" name="TextBox 22"/>
           <p:cNvSpPr txBox="1"/>
           <p:nvPr/>
@@ -4590,14 +4656,14 @@
           <p:nvPr/>
         </p:nvPicPr>
         <p:blipFill>
-          <a:blip r:embed="rId4"/>
+          <a:blip r:embed="rId3"/>
           <a:stretch>
             <a:fillRect/>
           </a:stretch>
         </p:blipFill>
         <p:spPr>
           <a:xfrm>
-            <a:off x="1009608" y="5373549"/>
+            <a:off x="1030390" y="5614609"/>
             <a:ext cx="16227219" cy="3641676"/>
           </a:xfrm>
           <a:prstGeom prst="rect">
@@ -4637,42 +4703,6 @@
       </p:grpSpPr>
       <p:pic>
         <p:nvPicPr>
-          <p:cNvPr id="8" name="Picture 7" descr="Shape, rectangle&#10;&#10;Description automatically generated">
-            <a:extLst>
-              <a:ext uri="{FF2B5EF4-FFF2-40B4-BE49-F238E27FC236}">
-                <a16:creationId xmlns:a16="http://schemas.microsoft.com/office/drawing/2014/main" id="{6BA5A0A7-A0F6-023F-8DF5-5894819FCD32}"/>
-              </a:ext>
-            </a:extLst>
-          </p:cNvPr>
-          <p:cNvPicPr>
-            <a:picLocks noChangeAspect="1"/>
-          </p:cNvPicPr>
-          <p:nvPr/>
-        </p:nvPicPr>
-        <p:blipFill>
-          <a:blip r:embed="rId2" cstate="print">
-            <a:extLst>
-              <a:ext uri="{28A0092B-C50C-407E-A947-70E740481C1C}">
-                <a14:useLocalDpi xmlns:a14="http://schemas.microsoft.com/office/drawing/2010/main" val="0"/>
-              </a:ext>
-            </a:extLst>
-          </a:blip>
-          <a:stretch>
-            <a:fillRect/>
-          </a:stretch>
-        </p:blipFill>
-        <p:spPr>
-          <a:xfrm rot="16200000">
-            <a:off x="3784325" y="7329306"/>
-            <a:ext cx="3463800" cy="1835443"/>
-          </a:xfrm>
-          <a:prstGeom prst="rect">
-            <a:avLst/>
-          </a:prstGeom>
-        </p:spPr>
-      </p:pic>
-      <p:pic>
-        <p:nvPicPr>
           <p:cNvPr id="2" name="Picture 2"/>
           <p:cNvPicPr>
             <a:picLocks noChangeAspect="1"/>
@@ -4680,7 +4710,7 @@
           <p:nvPr/>
         </p:nvPicPr>
         <p:blipFill>
-          <a:blip r:embed="rId3"/>
+          <a:blip r:embed="rId2"/>
           <a:srcRect t="21875" b="21875"/>
           <a:stretch>
             <a:fillRect/>
@@ -4698,13 +4728,59 @@
       </p:pic>
       <p:sp>
         <p:nvSpPr>
+          <p:cNvPr id="3" name="Rectangle 2">
+            <a:extLst>
+              <a:ext uri="{FF2B5EF4-FFF2-40B4-BE49-F238E27FC236}">
+                <a16:creationId xmlns:a16="http://schemas.microsoft.com/office/drawing/2014/main" id="{4DEDA887-7122-6E26-BE06-C34991CE053E}"/>
+              </a:ext>
+            </a:extLst>
+          </p:cNvPr>
+          <p:cNvSpPr/>
+          <p:nvPr/>
+        </p:nvSpPr>
+        <p:spPr>
+          <a:xfrm>
+            <a:off x="533400" y="2422228"/>
+            <a:ext cx="10439400" cy="7369472"/>
+          </a:xfrm>
+          <a:prstGeom prst="rect">
+            <a:avLst/>
+          </a:prstGeom>
+        </p:spPr>
+        <p:style>
+          <a:lnRef idx="2">
+            <a:schemeClr val="accent6">
+              <a:shade val="50000"/>
+            </a:schemeClr>
+          </a:lnRef>
+          <a:fillRef idx="1">
+            <a:schemeClr val="accent6"/>
+          </a:fillRef>
+          <a:effectRef idx="0">
+            <a:schemeClr val="accent6"/>
+          </a:effectRef>
+          <a:fontRef idx="minor">
+            <a:schemeClr val="lt1"/>
+          </a:fontRef>
+        </p:style>
+        <p:txBody>
+          <a:bodyPr rtlCol="0" anchor="ctr"/>
+          <a:lstStyle/>
+          <a:p>
+            <a:pPr algn="ctr"/>
+            <a:endParaRPr lang="it-IT"/>
+          </a:p>
+        </p:txBody>
+      </p:sp>
+      <p:sp>
+        <p:nvSpPr>
           <p:cNvPr id="22" name="TextBox 22"/>
           <p:cNvSpPr txBox="1"/>
           <p:nvPr/>
         </p:nvSpPr>
         <p:spPr>
           <a:xfrm>
-            <a:off x="1377255" y="1269961"/>
+            <a:off x="1066800" y="804005"/>
             <a:ext cx="9339684" cy="1090042"/>
           </a:xfrm>
           <a:prstGeom prst="rect">
@@ -4758,7 +4834,7 @@
           <p:nvPr/>
         </p:nvPicPr>
         <p:blipFill rotWithShape="1">
-          <a:blip r:embed="rId4">
+          <a:blip r:embed="rId3">
             <a:extLst>
               <a:ext uri="{28A0092B-C50C-407E-A947-70E740481C1C}">
                 <a14:useLocalDpi xmlns:a14="http://schemas.microsoft.com/office/drawing/2010/main" val="0"/>
@@ -5104,9 +5180,9 @@
           </a:p>
         </p:txBody>
       </p:sp>
-      <mc:AlternateContent xmlns:mc="http://schemas.openxmlformats.org/markup-compatibility/2006">
-        <mc:Choice xmlns:p14="http://schemas.microsoft.com/office/powerpoint/2010/main" Requires="p14">
-          <p:contentPart p14:bwMode="auto" r:id="rId5">
+      <mc:AlternateContent xmlns:mc="http://schemas.openxmlformats.org/markup-compatibility/2006" xmlns:p14="http://schemas.microsoft.com/office/powerpoint/2010/main">
+        <mc:Choice Requires="p14">
+          <p:contentPart p14:bwMode="auto" r:id="rId4">
             <p14:nvContentPartPr>
               <p14:cNvPr id="12" name="Input penna 11">
                 <a:extLst>
@@ -5124,7 +5200,7 @@
             </p14:xfrm>
           </p:contentPart>
         </mc:Choice>
-        <mc:Fallback>
+        <mc:Fallback xmlns="">
           <p:pic>
             <p:nvPicPr>
               <p:cNvPr id="12" name="Input penna 11">
@@ -5155,8 +5231,8 @@
           </p:pic>
         </mc:Fallback>
       </mc:AlternateContent>
-      <mc:AlternateContent xmlns:mc="http://schemas.openxmlformats.org/markup-compatibility/2006">
-        <mc:Choice xmlns:p14="http://schemas.microsoft.com/office/powerpoint/2010/main" Requires="p14">
+      <mc:AlternateContent xmlns:mc="http://schemas.openxmlformats.org/markup-compatibility/2006" xmlns:p14="http://schemas.microsoft.com/office/powerpoint/2010/main">
+        <mc:Choice Requires="p14">
           <p:contentPart p14:bwMode="auto" r:id="rId7">
             <p14:nvContentPartPr>
               <p14:cNvPr id="13" name="Input penna 12">
@@ -5175,7 +5251,7 @@
             </p14:xfrm>
           </p:contentPart>
         </mc:Choice>
-        <mc:Fallback>
+        <mc:Fallback xmlns="">
           <p:pic>
             <p:nvPicPr>
               <p:cNvPr id="13" name="Input penna 12">

</xml_diff>